<commit_message>
add customer last order date
</commit_message>
<xml_diff>
--- a/PMSClient/StandardDocs/PMI Non-Conformance Alert.pptx
+++ b/PMSClient/StandardDocs/PMI Non-Conformance Alert.pptx
@@ -250,7 +250,7 @@
           <a:p>
             <a:fld id="{7777F5DC-CD3D-4486-92FE-E58468983292}" type="datetimeFigureOut">
               <a:rPr lang="zh-CN" altLang="en-US" smtClean="0"/>
-              <a:t>2021/5/14</a:t>
+              <a:t>2021/5/20</a:t>
             </a:fld>
             <a:endParaRPr lang="zh-CN" altLang="en-US"/>
           </a:p>
@@ -361,6 +361,322 @@
 </file>
 
 <file path=ppt/slideLayouts/slideLayout10.xml><?xml version="1.0" encoding="utf-8"?>
+<p:sldLayout xmlns:a="http://schemas.openxmlformats.org/drawingml/2006/main" xmlns:r="http://schemas.openxmlformats.org/officeDocument/2006/relationships" xmlns:p="http://schemas.openxmlformats.org/presentationml/2006/main" preserve="1" userDrawn="1">
+  <p:cSld name="1_仅标题">
+    <p:spTree>
+      <p:nvGrpSpPr>
+        <p:cNvPr id="1" name=""/>
+        <p:cNvGrpSpPr/>
+        <p:nvPr/>
+      </p:nvGrpSpPr>
+      <p:grpSpPr>
+        <a:xfrm>
+          <a:off x="0" y="0"/>
+          <a:ext cx="0" cy="0"/>
+          <a:chOff x="0" y="0"/>
+          <a:chExt cx="0" cy="0"/>
+        </a:xfrm>
+      </p:grpSpPr>
+      <p:sp>
+        <p:nvSpPr>
+          <p:cNvPr id="2" name="标题 1">
+            <a:extLst>
+              <a:ext uri="{FF2B5EF4-FFF2-40B4-BE49-F238E27FC236}">
+                <a16:creationId xmlns:a16="http://schemas.microsoft.com/office/drawing/2014/main" id="{1F7467C8-253F-4538-A412-F7CF217EAC37}"/>
+              </a:ext>
+            </a:extLst>
+          </p:cNvPr>
+          <p:cNvSpPr>
+            <a:spLocks noGrp="1"/>
+          </p:cNvSpPr>
+          <p:nvPr>
+            <p:ph type="title"/>
+          </p:nvPr>
+        </p:nvSpPr>
+        <p:spPr/>
+        <p:txBody>
+          <a:bodyPr/>
+          <a:lstStyle/>
+          <a:p>
+            <a:r>
+              <a:rPr lang="zh-CN" altLang="en-US"/>
+              <a:t>单击此处编辑母版标题样式</a:t>
+            </a:r>
+          </a:p>
+        </p:txBody>
+      </p:sp>
+      <p:sp>
+        <p:nvSpPr>
+          <p:cNvPr id="3" name="日期占位符 2">
+            <a:extLst>
+              <a:ext uri="{FF2B5EF4-FFF2-40B4-BE49-F238E27FC236}">
+                <a16:creationId xmlns:a16="http://schemas.microsoft.com/office/drawing/2014/main" id="{BC8BE924-422E-4E8D-8AD8-DE64FE5A80AE}"/>
+              </a:ext>
+            </a:extLst>
+          </p:cNvPr>
+          <p:cNvSpPr>
+            <a:spLocks noGrp="1"/>
+          </p:cNvSpPr>
+          <p:nvPr>
+            <p:ph type="dt" sz="half" idx="10"/>
+          </p:nvPr>
+        </p:nvSpPr>
+        <p:spPr/>
+        <p:txBody>
+          <a:bodyPr/>
+          <a:lstStyle/>
+          <a:p>
+            <a:fld id="{7777F5DC-CD3D-4486-92FE-E58468983292}" type="datetimeFigureOut">
+              <a:rPr lang="zh-CN" altLang="en-US" smtClean="0"/>
+              <a:t>2021/5/20</a:t>
+            </a:fld>
+            <a:endParaRPr lang="zh-CN" altLang="en-US"/>
+          </a:p>
+        </p:txBody>
+      </p:sp>
+      <p:sp>
+        <p:nvSpPr>
+          <p:cNvPr id="4" name="页脚占位符 3">
+            <a:extLst>
+              <a:ext uri="{FF2B5EF4-FFF2-40B4-BE49-F238E27FC236}">
+                <a16:creationId xmlns:a16="http://schemas.microsoft.com/office/drawing/2014/main" id="{714A67A0-AE02-4EF2-B8E9-485BDAF8DA7D}"/>
+              </a:ext>
+            </a:extLst>
+          </p:cNvPr>
+          <p:cNvSpPr>
+            <a:spLocks noGrp="1"/>
+          </p:cNvSpPr>
+          <p:nvPr>
+            <p:ph type="ftr" sz="quarter" idx="11"/>
+          </p:nvPr>
+        </p:nvSpPr>
+        <p:spPr/>
+        <p:txBody>
+          <a:bodyPr/>
+          <a:lstStyle/>
+          <a:p>
+            <a:endParaRPr lang="zh-CN" altLang="en-US"/>
+          </a:p>
+        </p:txBody>
+      </p:sp>
+      <p:sp>
+        <p:nvSpPr>
+          <p:cNvPr id="5" name="灯片编号占位符 4">
+            <a:extLst>
+              <a:ext uri="{FF2B5EF4-FFF2-40B4-BE49-F238E27FC236}">
+                <a16:creationId xmlns:a16="http://schemas.microsoft.com/office/drawing/2014/main" id="{647B8667-3ABB-4719-9A03-31A3A72272FD}"/>
+              </a:ext>
+            </a:extLst>
+          </p:cNvPr>
+          <p:cNvSpPr>
+            <a:spLocks noGrp="1"/>
+          </p:cNvSpPr>
+          <p:nvPr>
+            <p:ph type="sldNum" sz="quarter" idx="12"/>
+          </p:nvPr>
+        </p:nvSpPr>
+        <p:spPr/>
+        <p:txBody>
+          <a:bodyPr/>
+          <a:lstStyle/>
+          <a:p>
+            <a:fld id="{7291E97C-37D6-44B5-A8C2-A552C45EF717}" type="slidenum">
+              <a:rPr lang="zh-CN" altLang="en-US" smtClean="0"/>
+              <a:t>‹#›</a:t>
+            </a:fld>
+            <a:endParaRPr lang="zh-CN" altLang="en-US"/>
+          </a:p>
+        </p:txBody>
+      </p:sp>
+      <p:sp>
+        <p:nvSpPr>
+          <p:cNvPr id="7" name="内容占位符 6">
+            <a:extLst>
+              <a:ext uri="{FF2B5EF4-FFF2-40B4-BE49-F238E27FC236}">
+                <a16:creationId xmlns:a16="http://schemas.microsoft.com/office/drawing/2014/main" id="{51D6BD96-3290-4CA1-BF38-0B9E752B6681}"/>
+              </a:ext>
+            </a:extLst>
+          </p:cNvPr>
+          <p:cNvSpPr>
+            <a:spLocks noGrp="1"/>
+          </p:cNvSpPr>
+          <p:nvPr>
+            <p:ph sz="quarter" idx="13"/>
+          </p:nvPr>
+        </p:nvSpPr>
+        <p:spPr>
+          <a:xfrm>
+            <a:off x="838200" y="1751013"/>
+            <a:ext cx="10515600" cy="4338637"/>
+          </a:xfrm>
+        </p:spPr>
+        <p:txBody>
+          <a:bodyPr/>
+          <a:lstStyle/>
+          <a:p>
+            <a:pPr lvl="0"/>
+            <a:r>
+              <a:rPr lang="zh-CN" altLang="en-US"/>
+              <a:t>单击此处编辑母版文本样式</a:t>
+            </a:r>
+          </a:p>
+          <a:p>
+            <a:pPr lvl="1"/>
+            <a:r>
+              <a:rPr lang="zh-CN" altLang="en-US"/>
+              <a:t>二级</a:t>
+            </a:r>
+          </a:p>
+          <a:p>
+            <a:pPr lvl="2"/>
+            <a:r>
+              <a:rPr lang="zh-CN" altLang="en-US"/>
+              <a:t>三级</a:t>
+            </a:r>
+          </a:p>
+          <a:p>
+            <a:pPr lvl="3"/>
+            <a:r>
+              <a:rPr lang="zh-CN" altLang="en-US"/>
+              <a:t>四级</a:t>
+            </a:r>
+          </a:p>
+          <a:p>
+            <a:pPr lvl="4"/>
+            <a:r>
+              <a:rPr lang="zh-CN" altLang="en-US"/>
+              <a:t>五级</a:t>
+            </a:r>
+          </a:p>
+        </p:txBody>
+      </p:sp>
+    </p:spTree>
+    <p:extLst>
+      <p:ext uri="{BB962C8B-B14F-4D97-AF65-F5344CB8AC3E}">
+        <p14:creationId xmlns:p14="http://schemas.microsoft.com/office/powerpoint/2010/main" val="149868720"/>
+      </p:ext>
+    </p:extLst>
+  </p:cSld>
+  <p:clrMapOvr>
+    <a:masterClrMapping/>
+  </p:clrMapOvr>
+</p:sldLayout>
+</file>
+
+<file path=ppt/slideLayouts/slideLayout11.xml><?xml version="1.0" encoding="utf-8"?>
+<p:sldLayout xmlns:a="http://schemas.openxmlformats.org/drawingml/2006/main" xmlns:r="http://schemas.openxmlformats.org/officeDocument/2006/relationships" xmlns:p="http://schemas.openxmlformats.org/presentationml/2006/main" type="blank" preserve="1">
+  <p:cSld name="空白">
+    <p:spTree>
+      <p:nvGrpSpPr>
+        <p:cNvPr id="1" name=""/>
+        <p:cNvGrpSpPr/>
+        <p:nvPr/>
+      </p:nvGrpSpPr>
+      <p:grpSpPr>
+        <a:xfrm>
+          <a:off x="0" y="0"/>
+          <a:ext cx="0" cy="0"/>
+          <a:chOff x="0" y="0"/>
+          <a:chExt cx="0" cy="0"/>
+        </a:xfrm>
+      </p:grpSpPr>
+      <p:sp>
+        <p:nvSpPr>
+          <p:cNvPr id="2" name="日期占位符 1">
+            <a:extLst>
+              <a:ext uri="{FF2B5EF4-FFF2-40B4-BE49-F238E27FC236}">
+                <a16:creationId xmlns:a16="http://schemas.microsoft.com/office/drawing/2014/main" id="{4B00C48A-4BF1-4B69-83FE-F308727CBB52}"/>
+              </a:ext>
+            </a:extLst>
+          </p:cNvPr>
+          <p:cNvSpPr>
+            <a:spLocks noGrp="1"/>
+          </p:cNvSpPr>
+          <p:nvPr>
+            <p:ph type="dt" sz="half" idx="10"/>
+          </p:nvPr>
+        </p:nvSpPr>
+        <p:spPr/>
+        <p:txBody>
+          <a:bodyPr/>
+          <a:lstStyle/>
+          <a:p>
+            <a:fld id="{7777F5DC-CD3D-4486-92FE-E58468983292}" type="datetimeFigureOut">
+              <a:rPr lang="zh-CN" altLang="en-US" smtClean="0"/>
+              <a:t>2021/5/20</a:t>
+            </a:fld>
+            <a:endParaRPr lang="zh-CN" altLang="en-US"/>
+          </a:p>
+        </p:txBody>
+      </p:sp>
+      <p:sp>
+        <p:nvSpPr>
+          <p:cNvPr id="3" name="页脚占位符 2">
+            <a:extLst>
+              <a:ext uri="{FF2B5EF4-FFF2-40B4-BE49-F238E27FC236}">
+                <a16:creationId xmlns:a16="http://schemas.microsoft.com/office/drawing/2014/main" id="{38FEC63E-C776-4881-B918-C806BE6D9019}"/>
+              </a:ext>
+            </a:extLst>
+          </p:cNvPr>
+          <p:cNvSpPr>
+            <a:spLocks noGrp="1"/>
+          </p:cNvSpPr>
+          <p:nvPr>
+            <p:ph type="ftr" sz="quarter" idx="11"/>
+          </p:nvPr>
+        </p:nvSpPr>
+        <p:spPr/>
+        <p:txBody>
+          <a:bodyPr/>
+          <a:lstStyle/>
+          <a:p>
+            <a:endParaRPr lang="zh-CN" altLang="en-US"/>
+          </a:p>
+        </p:txBody>
+      </p:sp>
+      <p:sp>
+        <p:nvSpPr>
+          <p:cNvPr id="4" name="灯片编号占位符 3">
+            <a:extLst>
+              <a:ext uri="{FF2B5EF4-FFF2-40B4-BE49-F238E27FC236}">
+                <a16:creationId xmlns:a16="http://schemas.microsoft.com/office/drawing/2014/main" id="{5F3DCA10-01EA-4FE3-8FA6-6724EF56CA28}"/>
+              </a:ext>
+            </a:extLst>
+          </p:cNvPr>
+          <p:cNvSpPr>
+            <a:spLocks noGrp="1"/>
+          </p:cNvSpPr>
+          <p:nvPr>
+            <p:ph type="sldNum" sz="quarter" idx="12"/>
+          </p:nvPr>
+        </p:nvSpPr>
+        <p:spPr/>
+        <p:txBody>
+          <a:bodyPr/>
+          <a:lstStyle/>
+          <a:p>
+            <a:fld id="{7291E97C-37D6-44B5-A8C2-A552C45EF717}" type="slidenum">
+              <a:rPr lang="zh-CN" altLang="en-US" smtClean="0"/>
+              <a:t>‹#›</a:t>
+            </a:fld>
+            <a:endParaRPr lang="zh-CN" altLang="en-US"/>
+          </a:p>
+        </p:txBody>
+      </p:sp>
+    </p:spTree>
+    <p:extLst>
+      <p:ext uri="{BB962C8B-B14F-4D97-AF65-F5344CB8AC3E}">
+        <p14:creationId xmlns:p14="http://schemas.microsoft.com/office/powerpoint/2010/main" val="3500231837"/>
+      </p:ext>
+    </p:extLst>
+  </p:cSld>
+  <p:clrMapOvr>
+    <a:masterClrMapping/>
+  </p:clrMapOvr>
+</p:sldLayout>
+</file>
+
+<file path=ppt/slideLayouts/slideLayout12.xml><?xml version="1.0" encoding="utf-8"?>
 <p:sldLayout xmlns:a="http://schemas.openxmlformats.org/drawingml/2006/main" xmlns:r="http://schemas.openxmlformats.org/officeDocument/2006/relationships" xmlns:p="http://schemas.openxmlformats.org/presentationml/2006/main" type="objTx" preserve="1">
   <p:cSld name="内容与标题">
     <p:spTree>
@@ -598,7 +914,7 @@
           <a:p>
             <a:fld id="{7777F5DC-CD3D-4486-92FE-E58468983292}" type="datetimeFigureOut">
               <a:rPr lang="zh-CN" altLang="en-US" smtClean="0"/>
-              <a:t>2021/5/14</a:t>
+              <a:t>2021/5/20</a:t>
             </a:fld>
             <a:endParaRPr lang="zh-CN" altLang="en-US"/>
           </a:p>
@@ -671,7 +987,7 @@
 </p:sldLayout>
 </file>
 
-<file path=ppt/slideLayouts/slideLayout11.xml><?xml version="1.0" encoding="utf-8"?>
+<file path=ppt/slideLayouts/slideLayout13.xml><?xml version="1.0" encoding="utf-8"?>
 <p:sldLayout xmlns:a="http://schemas.openxmlformats.org/drawingml/2006/main" xmlns:r="http://schemas.openxmlformats.org/officeDocument/2006/relationships" xmlns:p="http://schemas.openxmlformats.org/presentationml/2006/main" type="picTx" preserve="1">
   <p:cSld name="图片与标题">
     <p:spTree>
@@ -886,7 +1202,7 @@
           <a:p>
             <a:fld id="{7777F5DC-CD3D-4486-92FE-E58468983292}" type="datetimeFigureOut">
               <a:rPr lang="zh-CN" altLang="en-US" smtClean="0"/>
-              <a:t>2021/5/14</a:t>
+              <a:t>2021/5/20</a:t>
             </a:fld>
             <a:endParaRPr lang="zh-CN" altLang="en-US"/>
           </a:p>
@@ -1054,7 +1370,7 @@
           <a:p>
             <a:fld id="{7777F5DC-CD3D-4486-92FE-E58468983292}" type="datetimeFigureOut">
               <a:rPr lang="zh-CN" altLang="en-US" smtClean="0"/>
-              <a:t>2021/5/14</a:t>
+              <a:t>2021/5/20</a:t>
             </a:fld>
             <a:endParaRPr lang="zh-CN" altLang="en-US"/>
           </a:p>
@@ -1164,6 +1480,210 @@
 </file>
 
 <file path=ppt/slideLayouts/slideLayout3.xml><?xml version="1.0" encoding="utf-8"?>
+<p:sldLayout xmlns:a="http://schemas.openxmlformats.org/drawingml/2006/main" xmlns:r="http://schemas.openxmlformats.org/officeDocument/2006/relationships" xmlns:p="http://schemas.openxmlformats.org/presentationml/2006/main" preserve="1" userDrawn="1">
+  <p:cSld name="1_基本信息">
+    <p:spTree>
+      <p:nvGrpSpPr>
+        <p:cNvPr id="1" name=""/>
+        <p:cNvGrpSpPr/>
+        <p:nvPr/>
+      </p:nvGrpSpPr>
+      <p:grpSpPr>
+        <a:xfrm>
+          <a:off x="0" y="0"/>
+          <a:ext cx="0" cy="0"/>
+          <a:chOff x="0" y="0"/>
+          <a:chExt cx="0" cy="0"/>
+        </a:xfrm>
+      </p:grpSpPr>
+      <p:sp>
+        <p:nvSpPr>
+          <p:cNvPr id="3" name="内容占位符 2">
+            <a:extLst>
+              <a:ext uri="{FF2B5EF4-FFF2-40B4-BE49-F238E27FC236}">
+                <a16:creationId xmlns:a16="http://schemas.microsoft.com/office/drawing/2014/main" id="{83345EBF-471B-405D-9779-7B03713E73A5}"/>
+              </a:ext>
+            </a:extLst>
+          </p:cNvPr>
+          <p:cNvSpPr>
+            <a:spLocks noGrp="1"/>
+          </p:cNvSpPr>
+          <p:nvPr>
+            <p:ph idx="1" hasCustomPrompt="1"/>
+          </p:nvPr>
+        </p:nvSpPr>
+        <p:spPr>
+          <a:xfrm>
+            <a:off x="838200" y="1112808"/>
+            <a:ext cx="10515600" cy="5064155"/>
+          </a:xfrm>
+        </p:spPr>
+        <p:txBody>
+          <a:bodyPr/>
+          <a:lstStyle>
+            <a:lvl1pPr marL="0" indent="0">
+              <a:buNone/>
+              <a:defRPr/>
+            </a:lvl1pPr>
+          </a:lstStyle>
+          <a:p>
+            <a:pPr lvl="0"/>
+            <a:r>
+              <a:rPr lang="zh-CN" altLang="en-US" dirty="0"/>
+              <a:t>单击这里填写基本信息，密度，电阻率等</a:t>
+            </a:r>
+            <a:endParaRPr lang="en-US" altLang="zh-CN" dirty="0"/>
+          </a:p>
+          <a:p>
+            <a:pPr lvl="0"/>
+            <a:r>
+              <a:rPr lang="zh-CN" altLang="en-US" dirty="0"/>
+              <a:t>可直接从</a:t>
+            </a:r>
+            <a:r>
+              <a:rPr lang="en-US" altLang="zh-CN" dirty="0"/>
+              <a:t>PMS</a:t>
+            </a:r>
+            <a:r>
+              <a:rPr lang="zh-CN" altLang="en-US" dirty="0"/>
+              <a:t>当中复制</a:t>
+            </a:r>
+          </a:p>
+        </p:txBody>
+      </p:sp>
+      <p:sp>
+        <p:nvSpPr>
+          <p:cNvPr id="4" name="日期占位符 3">
+            <a:extLst>
+              <a:ext uri="{FF2B5EF4-FFF2-40B4-BE49-F238E27FC236}">
+                <a16:creationId xmlns:a16="http://schemas.microsoft.com/office/drawing/2014/main" id="{79214735-5D3C-43D7-8F1D-213FBA114BF1}"/>
+              </a:ext>
+            </a:extLst>
+          </p:cNvPr>
+          <p:cNvSpPr>
+            <a:spLocks noGrp="1"/>
+          </p:cNvSpPr>
+          <p:nvPr>
+            <p:ph type="dt" sz="half" idx="10"/>
+          </p:nvPr>
+        </p:nvSpPr>
+        <p:spPr/>
+        <p:txBody>
+          <a:bodyPr/>
+          <a:lstStyle/>
+          <a:p>
+            <a:fld id="{7777F5DC-CD3D-4486-92FE-E58468983292}" type="datetimeFigureOut">
+              <a:rPr lang="zh-CN" altLang="en-US" smtClean="0"/>
+              <a:t>2021/5/20</a:t>
+            </a:fld>
+            <a:endParaRPr lang="zh-CN" altLang="en-US"/>
+          </a:p>
+        </p:txBody>
+      </p:sp>
+      <p:sp>
+        <p:nvSpPr>
+          <p:cNvPr id="5" name="页脚占位符 4">
+            <a:extLst>
+              <a:ext uri="{FF2B5EF4-FFF2-40B4-BE49-F238E27FC236}">
+                <a16:creationId xmlns:a16="http://schemas.microsoft.com/office/drawing/2014/main" id="{F9A804A0-37A5-43B0-91E7-6727DCC66C1F}"/>
+              </a:ext>
+            </a:extLst>
+          </p:cNvPr>
+          <p:cNvSpPr>
+            <a:spLocks noGrp="1"/>
+          </p:cNvSpPr>
+          <p:nvPr>
+            <p:ph type="ftr" sz="quarter" idx="11"/>
+          </p:nvPr>
+        </p:nvSpPr>
+        <p:spPr/>
+        <p:txBody>
+          <a:bodyPr/>
+          <a:lstStyle/>
+          <a:p>
+            <a:endParaRPr lang="zh-CN" altLang="en-US"/>
+          </a:p>
+        </p:txBody>
+      </p:sp>
+      <p:sp>
+        <p:nvSpPr>
+          <p:cNvPr id="6" name="灯片编号占位符 5">
+            <a:extLst>
+              <a:ext uri="{FF2B5EF4-FFF2-40B4-BE49-F238E27FC236}">
+                <a16:creationId xmlns:a16="http://schemas.microsoft.com/office/drawing/2014/main" id="{5FEAB716-6850-498D-BEC7-9165CE15DC0C}"/>
+              </a:ext>
+            </a:extLst>
+          </p:cNvPr>
+          <p:cNvSpPr>
+            <a:spLocks noGrp="1"/>
+          </p:cNvSpPr>
+          <p:nvPr>
+            <p:ph type="sldNum" sz="quarter" idx="12"/>
+          </p:nvPr>
+        </p:nvSpPr>
+        <p:spPr/>
+        <p:txBody>
+          <a:bodyPr/>
+          <a:lstStyle/>
+          <a:p>
+            <a:fld id="{7291E97C-37D6-44B5-A8C2-A552C45EF717}" type="slidenum">
+              <a:rPr lang="zh-CN" altLang="en-US" smtClean="0"/>
+              <a:t>‹#›</a:t>
+            </a:fld>
+            <a:endParaRPr lang="zh-CN" altLang="en-US"/>
+          </a:p>
+        </p:txBody>
+      </p:sp>
+      <p:sp>
+        <p:nvSpPr>
+          <p:cNvPr id="8" name="文本框 7">
+            <a:extLst>
+              <a:ext uri="{FF2B5EF4-FFF2-40B4-BE49-F238E27FC236}">
+                <a16:creationId xmlns:a16="http://schemas.microsoft.com/office/drawing/2014/main" id="{102B0B33-D27B-4E6A-9D8C-772CF4D63D0F}"/>
+              </a:ext>
+            </a:extLst>
+          </p:cNvPr>
+          <p:cNvSpPr txBox="1"/>
+          <p:nvPr userDrawn="1"/>
+        </p:nvSpPr>
+        <p:spPr>
+          <a:xfrm>
+            <a:off x="838200" y="241540"/>
+            <a:ext cx="10515600" cy="584775"/>
+          </a:xfrm>
+          <a:prstGeom prst="rect">
+            <a:avLst/>
+          </a:prstGeom>
+          <a:noFill/>
+        </p:spPr>
+        <p:txBody>
+          <a:bodyPr wrap="square" rtlCol="0">
+            <a:spAutoFit/>
+          </a:bodyPr>
+          <a:lstStyle/>
+          <a:p>
+            <a:r>
+              <a:rPr lang="en-US" altLang="zh-CN" sz="3200" dirty="0"/>
+              <a:t>NCA Description</a:t>
+            </a:r>
+            <a:endParaRPr lang="zh-CN" altLang="en-US" sz="3200" dirty="0"/>
+          </a:p>
+        </p:txBody>
+      </p:sp>
+    </p:spTree>
+    <p:extLst>
+      <p:ext uri="{BB962C8B-B14F-4D97-AF65-F5344CB8AC3E}">
+        <p14:creationId xmlns:p14="http://schemas.microsoft.com/office/powerpoint/2010/main" val="1608921358"/>
+      </p:ext>
+    </p:extLst>
+  </p:cSld>
+  <p:clrMapOvr>
+    <a:masterClrMapping/>
+  </p:clrMapOvr>
+</p:sldLayout>
+</file>
+
+<file path=ppt/slideLayouts/slideLayout4.xml><?xml version="1.0" encoding="utf-8"?>
 <p:sldLayout xmlns:a="http://schemas.openxmlformats.org/drawingml/2006/main" xmlns:r="http://schemas.openxmlformats.org/officeDocument/2006/relationships" xmlns:p="http://schemas.openxmlformats.org/presentationml/2006/main" preserve="1" userDrawn="1">
   <p:cSld name="超声图片-主图">
     <p:spTree>
@@ -1203,7 +1723,7 @@
           <a:p>
             <a:fld id="{7777F5DC-CD3D-4486-92FE-E58468983292}" type="datetimeFigureOut">
               <a:rPr lang="zh-CN" altLang="en-US" smtClean="0"/>
-              <a:t>2021/5/14</a:t>
+              <a:t>2021/5/20</a:t>
             </a:fld>
             <a:endParaRPr lang="zh-CN" altLang="en-US"/>
           </a:p>
@@ -1339,7 +1859,7 @@
 </p:sldLayout>
 </file>
 
-<file path=ppt/slideLayouts/slideLayout4.xml><?xml version="1.0" encoding="utf-8"?>
+<file path=ppt/slideLayouts/slideLayout5.xml><?xml version="1.0" encoding="utf-8"?>
 <p:sldLayout xmlns:a="http://schemas.openxmlformats.org/drawingml/2006/main" xmlns:r="http://schemas.openxmlformats.org/officeDocument/2006/relationships" xmlns:p="http://schemas.openxmlformats.org/presentationml/2006/main" preserve="1" userDrawn="1">
   <p:cSld name="标准照片三图">
     <p:spTree>
@@ -1496,7 +2016,7 @@
           <a:p>
             <a:fld id="{7777F5DC-CD3D-4486-92FE-E58468983292}" type="datetimeFigureOut">
               <a:rPr lang="zh-CN" altLang="en-US" smtClean="0"/>
-              <a:t>2021/5/14</a:t>
+              <a:t>2021/5/20</a:t>
             </a:fld>
             <a:endParaRPr lang="zh-CN" altLang="en-US"/>
           </a:p>
@@ -1804,7 +2324,7 @@
 </p:sldLayout>
 </file>
 
-<file path=ppt/slideLayouts/slideLayout5.xml><?xml version="1.0" encoding="utf-8"?>
+<file path=ppt/slideLayouts/slideLayout6.xml><?xml version="1.0" encoding="utf-8"?>
 <p:sldLayout xmlns:a="http://schemas.openxmlformats.org/drawingml/2006/main" xmlns:r="http://schemas.openxmlformats.org/officeDocument/2006/relationships" xmlns:p="http://schemas.openxmlformats.org/presentationml/2006/main" preserve="1" userDrawn="1">
   <p:cSld name="自定义照片三图">
     <p:spTree>
@@ -2032,7 +2552,7 @@
           <a:p>
             <a:fld id="{7777F5DC-CD3D-4486-92FE-E58468983292}" type="datetimeFigureOut">
               <a:rPr lang="zh-CN" altLang="en-US" smtClean="0"/>
-              <a:t>2021/5/14</a:t>
+              <a:t>2021/5/20</a:t>
             </a:fld>
             <a:endParaRPr lang="zh-CN" altLang="en-US"/>
           </a:p>
@@ -2371,7 +2891,7 @@
 </p:sldLayout>
 </file>
 
-<file path=ppt/slideLayouts/slideLayout6.xml><?xml version="1.0" encoding="utf-8"?>
+<file path=ppt/slideLayouts/slideLayout7.xml><?xml version="1.0" encoding="utf-8"?>
 <p:sldLayout xmlns:a="http://schemas.openxmlformats.org/drawingml/2006/main" xmlns:r="http://schemas.openxmlformats.org/officeDocument/2006/relationships" xmlns:p="http://schemas.openxmlformats.org/presentationml/2006/main" type="twoObj" preserve="1">
   <p:cSld name="照片-两图">
     <p:spTree>
@@ -2585,7 +3105,7 @@
           <a:p>
             <a:fld id="{7777F5DC-CD3D-4486-92FE-E58468983292}" type="datetimeFigureOut">
               <a:rPr lang="zh-CN" altLang="en-US" smtClean="0"/>
-              <a:t>2021/5/14</a:t>
+              <a:t>2021/5/20</a:t>
             </a:fld>
             <a:endParaRPr lang="zh-CN" altLang="en-US"/>
           </a:p>
@@ -2658,7 +3178,7 @@
 </p:sldLayout>
 </file>
 
-<file path=ppt/slideLayouts/slideLayout7.xml><?xml version="1.0" encoding="utf-8"?>
+<file path=ppt/slideLayouts/slideLayout8.xml><?xml version="1.0" encoding="utf-8"?>
 <p:sldLayout xmlns:a="http://schemas.openxmlformats.org/drawingml/2006/main" xmlns:r="http://schemas.openxmlformats.org/officeDocument/2006/relationships" xmlns:p="http://schemas.openxmlformats.org/presentationml/2006/main" type="secHead" preserve="1">
   <p:cSld name="节标题">
     <p:spTree>
@@ -2860,7 +3380,7 @@
           <a:p>
             <a:fld id="{7777F5DC-CD3D-4486-92FE-E58468983292}" type="datetimeFigureOut">
               <a:rPr lang="zh-CN" altLang="en-US" smtClean="0"/>
-              <a:t>2021/5/14</a:t>
+              <a:t>2021/5/20</a:t>
             </a:fld>
             <a:endParaRPr lang="zh-CN" altLang="en-US"/>
           </a:p>
@@ -2933,7 +3453,7 @@
 </p:sldLayout>
 </file>
 
-<file path=ppt/slideLayouts/slideLayout8.xml><?xml version="1.0" encoding="utf-8"?>
+<file path=ppt/slideLayouts/slideLayout9.xml><?xml version="1.0" encoding="utf-8"?>
 <p:sldLayout xmlns:a="http://schemas.openxmlformats.org/drawingml/2006/main" xmlns:r="http://schemas.openxmlformats.org/officeDocument/2006/relationships" xmlns:p="http://schemas.openxmlformats.org/presentationml/2006/main" type="titleOnly" preserve="1">
   <p:cSld name="仅标题">
     <p:spTree>
@@ -3001,7 +3521,7 @@
           <a:p>
             <a:fld id="{7777F5DC-CD3D-4486-92FE-E58468983292}" type="datetimeFigureOut">
               <a:rPr lang="zh-CN" altLang="en-US" smtClean="0"/>
-              <a:t>2021/5/14</a:t>
+              <a:t>2021/5/20</a:t>
             </a:fld>
             <a:endParaRPr lang="zh-CN" altLang="en-US"/>
           </a:p>
@@ -3065,119 +3585,6 @@
     <p:extLst>
       <p:ext uri="{BB962C8B-B14F-4D97-AF65-F5344CB8AC3E}">
         <p14:creationId xmlns:p14="http://schemas.microsoft.com/office/powerpoint/2010/main" val="3221200758"/>
-      </p:ext>
-    </p:extLst>
-  </p:cSld>
-  <p:clrMapOvr>
-    <a:masterClrMapping/>
-  </p:clrMapOvr>
-</p:sldLayout>
-</file>
-
-<file path=ppt/slideLayouts/slideLayout9.xml><?xml version="1.0" encoding="utf-8"?>
-<p:sldLayout xmlns:a="http://schemas.openxmlformats.org/drawingml/2006/main" xmlns:r="http://schemas.openxmlformats.org/officeDocument/2006/relationships" xmlns:p="http://schemas.openxmlformats.org/presentationml/2006/main" type="blank" preserve="1">
-  <p:cSld name="空白">
-    <p:spTree>
-      <p:nvGrpSpPr>
-        <p:cNvPr id="1" name=""/>
-        <p:cNvGrpSpPr/>
-        <p:nvPr/>
-      </p:nvGrpSpPr>
-      <p:grpSpPr>
-        <a:xfrm>
-          <a:off x="0" y="0"/>
-          <a:ext cx="0" cy="0"/>
-          <a:chOff x="0" y="0"/>
-          <a:chExt cx="0" cy="0"/>
-        </a:xfrm>
-      </p:grpSpPr>
-      <p:sp>
-        <p:nvSpPr>
-          <p:cNvPr id="2" name="日期占位符 1">
-            <a:extLst>
-              <a:ext uri="{FF2B5EF4-FFF2-40B4-BE49-F238E27FC236}">
-                <a16:creationId xmlns:a16="http://schemas.microsoft.com/office/drawing/2014/main" id="{4B00C48A-4BF1-4B69-83FE-F308727CBB52}"/>
-              </a:ext>
-            </a:extLst>
-          </p:cNvPr>
-          <p:cNvSpPr>
-            <a:spLocks noGrp="1"/>
-          </p:cNvSpPr>
-          <p:nvPr>
-            <p:ph type="dt" sz="half" idx="10"/>
-          </p:nvPr>
-        </p:nvSpPr>
-        <p:spPr/>
-        <p:txBody>
-          <a:bodyPr/>
-          <a:lstStyle/>
-          <a:p>
-            <a:fld id="{7777F5DC-CD3D-4486-92FE-E58468983292}" type="datetimeFigureOut">
-              <a:rPr lang="zh-CN" altLang="en-US" smtClean="0"/>
-              <a:t>2021/5/14</a:t>
-            </a:fld>
-            <a:endParaRPr lang="zh-CN" altLang="en-US"/>
-          </a:p>
-        </p:txBody>
-      </p:sp>
-      <p:sp>
-        <p:nvSpPr>
-          <p:cNvPr id="3" name="页脚占位符 2">
-            <a:extLst>
-              <a:ext uri="{FF2B5EF4-FFF2-40B4-BE49-F238E27FC236}">
-                <a16:creationId xmlns:a16="http://schemas.microsoft.com/office/drawing/2014/main" id="{38FEC63E-C776-4881-B918-C806BE6D9019}"/>
-              </a:ext>
-            </a:extLst>
-          </p:cNvPr>
-          <p:cNvSpPr>
-            <a:spLocks noGrp="1"/>
-          </p:cNvSpPr>
-          <p:nvPr>
-            <p:ph type="ftr" sz="quarter" idx="11"/>
-          </p:nvPr>
-        </p:nvSpPr>
-        <p:spPr/>
-        <p:txBody>
-          <a:bodyPr/>
-          <a:lstStyle/>
-          <a:p>
-            <a:endParaRPr lang="zh-CN" altLang="en-US"/>
-          </a:p>
-        </p:txBody>
-      </p:sp>
-      <p:sp>
-        <p:nvSpPr>
-          <p:cNvPr id="4" name="灯片编号占位符 3">
-            <a:extLst>
-              <a:ext uri="{FF2B5EF4-FFF2-40B4-BE49-F238E27FC236}">
-                <a16:creationId xmlns:a16="http://schemas.microsoft.com/office/drawing/2014/main" id="{5F3DCA10-01EA-4FE3-8FA6-6724EF56CA28}"/>
-              </a:ext>
-            </a:extLst>
-          </p:cNvPr>
-          <p:cNvSpPr>
-            <a:spLocks noGrp="1"/>
-          </p:cNvSpPr>
-          <p:nvPr>
-            <p:ph type="sldNum" sz="quarter" idx="12"/>
-          </p:nvPr>
-        </p:nvSpPr>
-        <p:spPr/>
-        <p:txBody>
-          <a:bodyPr/>
-          <a:lstStyle/>
-          <a:p>
-            <a:fld id="{7291E97C-37D6-44B5-A8C2-A552C45EF717}" type="slidenum">
-              <a:rPr lang="zh-CN" altLang="en-US" smtClean="0"/>
-              <a:t>‹#›</a:t>
-            </a:fld>
-            <a:endParaRPr lang="zh-CN" altLang="en-US"/>
-          </a:p>
-        </p:txBody>
-      </p:sp>
-    </p:spTree>
-    <p:extLst>
-      <p:ext uri="{BB962C8B-B14F-4D97-AF65-F5344CB8AC3E}">
-        <p14:creationId xmlns:p14="http://schemas.microsoft.com/office/powerpoint/2010/main" val="3500231837"/>
       </p:ext>
     </p:extLst>
   </p:cSld>
@@ -3358,7 +3765,7 @@
           <a:p>
             <a:fld id="{7777F5DC-CD3D-4486-92FE-E58468983292}" type="datetimeFigureOut">
               <a:rPr lang="zh-CN" altLang="en-US" smtClean="0"/>
-              <a:t>2021/5/14</a:t>
+              <a:t>2021/5/20</a:t>
             </a:fld>
             <a:endParaRPr lang="zh-CN" altLang="en-US"/>
           </a:p>
@@ -3465,15 +3872,17 @@
   <p:sldLayoutIdLst>
     <p:sldLayoutId id="2147483649" r:id="rId1"/>
     <p:sldLayoutId id="2147483650" r:id="rId2"/>
-    <p:sldLayoutId id="2147483659" r:id="rId3"/>
-    <p:sldLayoutId id="2147483658" r:id="rId4"/>
-    <p:sldLayoutId id="2147483653" r:id="rId5"/>
-    <p:sldLayoutId id="2147483652" r:id="rId6"/>
-    <p:sldLayoutId id="2147483651" r:id="rId7"/>
-    <p:sldLayoutId id="2147483654" r:id="rId8"/>
-    <p:sldLayoutId id="2147483655" r:id="rId9"/>
-    <p:sldLayoutId id="2147483656" r:id="rId10"/>
-    <p:sldLayoutId id="2147483657" r:id="rId11"/>
+    <p:sldLayoutId id="2147483661" r:id="rId3"/>
+    <p:sldLayoutId id="2147483659" r:id="rId4"/>
+    <p:sldLayoutId id="2147483658" r:id="rId5"/>
+    <p:sldLayoutId id="2147483653" r:id="rId6"/>
+    <p:sldLayoutId id="2147483652" r:id="rId7"/>
+    <p:sldLayoutId id="2147483651" r:id="rId8"/>
+    <p:sldLayoutId id="2147483654" r:id="rId9"/>
+    <p:sldLayoutId id="2147483660" r:id="rId10"/>
+    <p:sldLayoutId id="2147483655" r:id="rId11"/>
+    <p:sldLayoutId id="2147483656" r:id="rId12"/>
+    <p:sldLayoutId id="2147483657" r:id="rId13"/>
   </p:sldLayoutIdLst>
   <p:txStyles>
     <p:titleStyle>

</xml_diff>